<commit_message>
Updates for lesson 2.
</commit_message>
<xml_diff>
--- a/slides/Lesson1.pptx
+++ b/slides/Lesson1.pptx
@@ -212,7 +212,7 @@
           <a:p>
             <a:fld id="{B065A488-1AC6-B649-A88A-91D0E808665E}" type="datetimeFigureOut">
               <a:rPr lang="en-US" smtClean="0"/>
-              <a:t>9/13/18</a:t>
+              <a:t>9/17/18</a:t>
             </a:fld>
             <a:endParaRPr lang="en-US" dirty="0"/>
           </a:p>
@@ -650,7 +650,7 @@
           <a:p>
             <a:fld id="{48A87A34-81AB-432B-8DAE-1953F412C126}" type="datetimeFigureOut">
               <a:rPr lang="en-US"/>
-              <a:t>9/13/18</a:t>
+              <a:t>9/17/18</a:t>
             </a:fld>
             <a:endParaRPr lang="en-US" dirty="0"/>
           </a:p>
@@ -912,7 +912,7 @@
           <a:p>
             <a:fld id="{48A87A34-81AB-432B-8DAE-1953F412C126}" type="datetimeFigureOut">
               <a:rPr lang="en-US"/>
-              <a:t>9/13/18</a:t>
+              <a:t>9/17/18</a:t>
             </a:fld>
             <a:endParaRPr lang="en-US" dirty="0"/>
           </a:p>
@@ -1139,7 +1139,7 @@
             <a:fld id="{48A87A34-81AB-432B-8DAE-1953F412C126}" type="datetimeFigureOut">
               <a:rPr lang="en-US"/>
               <a:pPr/>
-              <a:t>9/13/18</a:t>
+              <a:t>9/17/18</a:t>
             </a:fld>
             <a:endParaRPr lang="en-US" dirty="0"/>
           </a:p>
@@ -1445,7 +1445,7 @@
             <a:fld id="{48A87A34-81AB-432B-8DAE-1953F412C126}" type="datetimeFigureOut">
               <a:rPr lang="en-US"/>
               <a:pPr/>
-              <a:t>9/13/18</a:t>
+              <a:t>9/17/18</a:t>
             </a:fld>
             <a:endParaRPr lang="en-US" dirty="0"/>
           </a:p>
@@ -1914,7 +1914,7 @@
             <a:fld id="{48A87A34-81AB-432B-8DAE-1953F412C126}" type="datetimeFigureOut">
               <a:rPr lang="en-US"/>
               <a:pPr/>
-              <a:t>9/13/18</a:t>
+              <a:t>9/17/18</a:t>
             </a:fld>
             <a:endParaRPr lang="en-US" dirty="0"/>
           </a:p>
@@ -2456,7 +2456,7 @@
           <a:p>
             <a:fld id="{48A87A34-81AB-432B-8DAE-1953F412C126}" type="datetimeFigureOut">
               <a:rPr lang="en-US"/>
-              <a:t>9/13/18</a:t>
+              <a:t>9/17/18</a:t>
             </a:fld>
             <a:endParaRPr lang="en-US" dirty="0"/>
           </a:p>
@@ -3225,7 +3225,7 @@
           <a:p>
             <a:fld id="{48A87A34-81AB-432B-8DAE-1953F412C126}" type="datetimeFigureOut">
               <a:rPr lang="en-US"/>
-              <a:t>9/13/18</a:t>
+              <a:t>9/17/18</a:t>
             </a:fld>
             <a:endParaRPr lang="en-US" dirty="0"/>
           </a:p>
@@ -3395,7 +3395,7 @@
           <a:p>
             <a:fld id="{48A87A34-81AB-432B-8DAE-1953F412C126}" type="datetimeFigureOut">
               <a:rPr lang="en-US"/>
-              <a:t>9/13/18</a:t>
+              <a:t>9/17/18</a:t>
             </a:fld>
             <a:endParaRPr lang="en-US" dirty="0"/>
           </a:p>
@@ -3614,7 +3614,7 @@
             <a:fld id="{48A87A34-81AB-432B-8DAE-1953F412C126}" type="datetimeFigureOut">
               <a:rPr lang="en-US"/>
               <a:pPr/>
-              <a:t>9/13/18</a:t>
+              <a:t>9/17/18</a:t>
             </a:fld>
             <a:endParaRPr lang="en-US" dirty="0"/>
           </a:p>
@@ -3789,7 +3789,7 @@
           <a:p>
             <a:fld id="{48A87A34-81AB-432B-8DAE-1953F412C126}" type="datetimeFigureOut">
               <a:rPr lang="en-US"/>
-              <a:t>9/13/18</a:t>
+              <a:t>9/17/18</a:t>
             </a:fld>
             <a:endParaRPr lang="en-US" dirty="0"/>
           </a:p>
@@ -4074,7 +4074,7 @@
             <a:fld id="{48A87A34-81AB-432B-8DAE-1953F412C126}" type="datetimeFigureOut">
               <a:rPr lang="en-US"/>
               <a:pPr/>
-              <a:t>9/13/18</a:t>
+              <a:t>9/17/18</a:t>
             </a:fld>
             <a:endParaRPr lang="en-US" dirty="0"/>
           </a:p>
@@ -4311,7 +4311,7 @@
           <a:p>
             <a:fld id="{48A87A34-81AB-432B-8DAE-1953F412C126}" type="datetimeFigureOut">
               <a:rPr lang="en-US"/>
-              <a:t>9/13/18</a:t>
+              <a:t>9/17/18</a:t>
             </a:fld>
             <a:endParaRPr lang="en-US" dirty="0"/>
           </a:p>
@@ -4685,7 +4685,7 @@
           <a:p>
             <a:fld id="{48A87A34-81AB-432B-8DAE-1953F412C126}" type="datetimeFigureOut">
               <a:rPr lang="en-US"/>
-              <a:t>9/13/18</a:t>
+              <a:t>9/17/18</a:t>
             </a:fld>
             <a:endParaRPr lang="en-US" dirty="0"/>
           </a:p>
@@ -4798,7 +4798,7 @@
           <a:p>
             <a:fld id="{48A87A34-81AB-432B-8DAE-1953F412C126}" type="datetimeFigureOut">
               <a:rPr lang="en-US"/>
-              <a:t>9/13/18</a:t>
+              <a:t>9/17/18</a:t>
             </a:fld>
             <a:endParaRPr lang="en-US" dirty="0"/>
           </a:p>
@@ -4888,7 +4888,7 @@
           <a:p>
             <a:fld id="{48A87A34-81AB-432B-8DAE-1953F412C126}" type="datetimeFigureOut">
               <a:rPr lang="en-US"/>
-              <a:t>9/13/18</a:t>
+              <a:t>9/17/18</a:t>
             </a:fld>
             <a:endParaRPr lang="en-US" dirty="0"/>
           </a:p>
@@ -5132,7 +5132,7 @@
           <a:p>
             <a:fld id="{48A87A34-81AB-432B-8DAE-1953F412C126}" type="datetimeFigureOut">
               <a:rPr lang="en-US"/>
-              <a:t>9/13/18</a:t>
+              <a:t>9/17/18</a:t>
             </a:fld>
             <a:endParaRPr lang="en-US" dirty="0"/>
           </a:p>
@@ -5384,7 +5384,7 @@
           <a:p>
             <a:fld id="{48A87A34-81AB-432B-8DAE-1953F412C126}" type="datetimeFigureOut">
               <a:rPr lang="en-US"/>
-              <a:t>9/13/18</a:t>
+              <a:t>9/17/18</a:t>
             </a:fld>
             <a:endParaRPr lang="en-US" dirty="0"/>
           </a:p>
@@ -5623,7 +5623,7 @@
             <a:fld id="{48A87A34-81AB-432B-8DAE-1953F412C126}" type="datetimeFigureOut">
               <a:rPr lang="en-US"/>
               <a:pPr/>
-              <a:t>9/13/18</a:t>
+              <a:t>9/17/18</a:t>
             </a:fld>
             <a:endParaRPr lang="en-US" dirty="0"/>
           </a:p>
@@ -6063,10 +6063,15 @@
             <p:ph type="subTitle" idx="1"/>
           </p:nvPr>
         </p:nvSpPr>
-        <p:spPr/>
+        <p:spPr>
+          <a:xfrm>
+            <a:off x="1371600" y="3632201"/>
+            <a:ext cx="9448800" cy="1035492"/>
+          </a:xfrm>
+        </p:spPr>
         <p:txBody>
           <a:bodyPr>
-            <a:normAutofit fontScale="92500" lnSpcReduction="10000"/>
+            <a:normAutofit fontScale="92500" lnSpcReduction="20000"/>
           </a:bodyPr>
           <a:lstStyle/>
           <a:p>
@@ -6075,7 +6080,21 @@
           <a:p>
             <a:r>
               <a:rPr lang="en-US" dirty="0" smtClean="0"/>
-              <a:t>Dr. Charles “Chuck” Bell</a:t>
+              <a:t>Dr. Charles “Chuck” </a:t>
+            </a:r>
+            <a:r>
+              <a:rPr lang="en-US" dirty="0" smtClean="0"/>
+              <a:t>Bell</a:t>
+            </a:r>
+          </a:p>
+          <a:p>
+            <a:r>
+              <a:rPr lang="en-US" smtClean="0"/>
+              <a:t>Lesson 1: 12 </a:t>
+            </a:r>
+            <a:r>
+              <a:rPr lang="en-US" dirty="0" smtClean="0"/>
+              <a:t>September 2018</a:t>
             </a:r>
             <a:endParaRPr lang="en-US" dirty="0"/>
           </a:p>
@@ -7689,14 +7708,14 @@
             </a:ln>
             <a:extLst>
               <a:ext uri="{909E8E84-426E-40dd-AFC4-6F175D3DCCD1}">
-                <a14:hiddenFill xmlns="" xmlns:a14="http://schemas.microsoft.com/office/drawing/2010/main">
+                <a14:hiddenFill xmlns:a14="http://schemas.microsoft.com/office/drawing/2010/main" xmlns="">
                   <a:solidFill>
                     <a:srgbClr val="FFFFFF"/>
                   </a:solidFill>
                 </a14:hiddenFill>
               </a:ext>
               <a:ext uri="{91240B29-F687-4f45-9708-019B960494DF}">
-                <a14:hiddenLine xmlns="" xmlns:a14="http://schemas.microsoft.com/office/drawing/2010/main" w="9525">
+                <a14:hiddenLine xmlns:a14="http://schemas.microsoft.com/office/drawing/2010/main" xmlns="" w="9525">
                   <a:solidFill>
                     <a:srgbClr val="000000"/>
                   </a:solidFill>
@@ -8591,7 +8610,7 @@
           <a:p>
             <a:fld id="{B696ECFC-7A24-9D4D-A2F6-14E025D39F39}" type="datetime1">
               <a:rPr lang="en-US" smtClean="0"/>
-              <a:t>9/13/18</a:t>
+              <a:t>9/17/18</a:t>
             </a:fld>
             <a:endParaRPr lang="en-US" dirty="0"/>
           </a:p>

</xml_diff>